<commit_message>
modified:   apiKEYS.json 	modified:   app/index.html 	modified:   bin/flightplan.js 	modified:   res/SpaceApps.pptx 	new file:   res/images.png 	new file:   res/waypoint-symbol.png
</commit_message>
<xml_diff>
--- a/res/SpaceApps.pptx
+++ b/res/SpaceApps.pptx
@@ -5,17 +5,16 @@
     <p:sldMasterId id="2147483648" r:id="rId1"/>
   </p:sldMasterIdLst>
   <p:notesMasterIdLst>
-    <p:notesMasterId r:id="rId10"/>
+    <p:notesMasterId r:id="rId9"/>
   </p:notesMasterIdLst>
   <p:sldIdLst>
     <p:sldId id="260" r:id="rId2"/>
     <p:sldId id="259" r:id="rId3"/>
-    <p:sldId id="261" r:id="rId4"/>
-    <p:sldId id="262" r:id="rId5"/>
-    <p:sldId id="263" r:id="rId6"/>
-    <p:sldId id="264" r:id="rId7"/>
-    <p:sldId id="265" r:id="rId8"/>
-    <p:sldId id="266" r:id="rId9"/>
+    <p:sldId id="263" r:id="rId4"/>
+    <p:sldId id="267" r:id="rId5"/>
+    <p:sldId id="264" r:id="rId6"/>
+    <p:sldId id="265" r:id="rId7"/>
+    <p:sldId id="266" r:id="rId8"/>
   </p:sldIdLst>
   <p:sldSz cx="9144000" cy="6858000" type="screen4x3"/>
   <p:notesSz cx="6858000" cy="9144000"/>
@@ -3750,20 +3749,14 @@
               <a:rPr lang="en-CA" dirty="0">
                 <a:effectLst/>
               </a:rPr>
-              <a:t>“challenge</a:t>
-            </a:r>
-            <a:r>
-              <a:rPr lang="en-CA">
-                <a:effectLst/>
-              </a:rPr>
-              <a:t>”: “</a:t>
-            </a:r>
-            <a:r>
-              <a:rPr lang="en-CA"/>
+              <a:t>“challenge”: “</a:t>
+            </a:r>
+            <a:r>
+              <a:rPr lang="en-CA" dirty="0"/>
               <a:t>1D, 2D, 3D, GO!</a:t>
             </a:r>
             <a:r>
-              <a:rPr lang="en-CA">
+              <a:rPr lang="en-CA" dirty="0">
                 <a:effectLst/>
               </a:rPr>
               <a:t>”,</a:t>
@@ -3784,7 +3777,7 @@
             </a:r>
             <a:r>
               <a:rPr lang="en-CA" dirty="0"/>
-              <a:t>“Web-based Space Mission Visualization and Situational Awareness App”,</a:t>
+              <a:t>“Web-based App Radiation Management”,</a:t>
             </a:r>
             <a:br>
               <a:rPr lang="en-CA" dirty="0">
@@ -3968,13 +3961,13 @@
         </p:nvSpPr>
         <p:spPr>
           <a:xfrm>
-            <a:off x="381000" y="685800"/>
-            <a:ext cx="7924800" cy="5867400"/>
+            <a:off x="228600" y="685800"/>
+            <a:ext cx="8077200" cy="5867400"/>
           </a:xfrm>
         </p:spPr>
         <p:txBody>
           <a:bodyPr>
-            <a:normAutofit fontScale="85000" lnSpcReduction="20000"/>
+            <a:normAutofit fontScale="92500" lnSpcReduction="20000"/>
           </a:bodyPr>
           <a:lstStyle/>
           <a:p>
@@ -4033,7 +4026,7 @@
               <a:rPr lang="en-CA" sz="1900" dirty="0">
                 <a:effectLst/>
               </a:rPr>
-              <a:t>“occupation" : “Student </a:t>
+              <a:t>“occupation" : “University of Waterloo Student </a:t>
             </a:r>
             <a:r>
               <a:rPr lang="en-CA" sz="1900" dirty="0"/>
@@ -4054,7 +4047,7 @@
               <a:rPr lang="en-CA" sz="1900" dirty="0">
                 <a:effectLst/>
               </a:rPr>
-              <a:t>"company" : “Waterloo University",</a:t>
+              <a:t>"email" : “vroch@edu.uwaterloo.ca",</a:t>
             </a:r>
             <a:br>
               <a:rPr lang="en-CA" sz="1900" dirty="0">
@@ -4065,7 +4058,17 @@
               <a:rPr lang="en-CA" sz="1900" dirty="0">
                 <a:effectLst/>
               </a:rPr>
-              <a:t>"email" : “vroch@edu.uwaterloo.ca",</a:t>
+              <a:t>"mobile" : "(613) </a:t>
+            </a:r>
+            <a:r>
+              <a:rPr lang="en-CA" sz="1900" dirty="0"/>
+              <a:t>408</a:t>
+            </a:r>
+            <a:r>
+              <a:rPr lang="en-CA" sz="1900" dirty="0">
+                <a:effectLst/>
+              </a:rPr>
+              <a:t>-2495"</a:t>
             </a:r>
             <a:br>
               <a:rPr lang="en-CA" sz="1900" dirty="0">
@@ -4076,17 +4079,81 @@
               <a:rPr lang="en-CA" sz="1900" dirty="0">
                 <a:effectLst/>
               </a:rPr>
-              <a:t>"mobile" : "(613) </a:t>
-            </a:r>
-            <a:r>
-              <a:rPr lang="en-CA" sz="1900" dirty="0"/>
-              <a:t>408</a:t>
-            </a:r>
+              <a:t>}</a:t>
+            </a:r>
+          </a:p>
+          <a:p>
+            <a:pPr marL="0" indent="0">
+              <a:spcBef>
+                <a:spcPts val="300"/>
+              </a:spcBef>
+              <a:buNone/>
+            </a:pPr>
+            <a:endParaRPr lang="en-US" sz="1900" dirty="0"/>
+          </a:p>
+          <a:p>
+            <a:pPr marL="0" indent="0">
+              <a:spcBef>
+                <a:spcPts val="300"/>
+              </a:spcBef>
+              <a:buNone/>
+            </a:pPr>
+            <a:endParaRPr lang="en-CA" sz="1900" dirty="0"/>
+          </a:p>
+          <a:p>
+            <a:pPr marL="0" indent="0">
+              <a:spcBef>
+                <a:spcPts val="300"/>
+              </a:spcBef>
+              <a:buNone/>
+            </a:pPr>
             <a:r>
               <a:rPr lang="en-CA" sz="1900" dirty="0">
                 <a:effectLst/>
               </a:rPr>
-              <a:t>-2495"</a:t>
+              <a:t>{ </a:t>
+            </a:r>
+          </a:p>
+          <a:p>
+            <a:pPr marL="0" indent="0">
+              <a:spcBef>
+                <a:spcPts val="300"/>
+              </a:spcBef>
+              <a:buNone/>
+            </a:pPr>
+            <a:r>
+              <a:rPr lang="en-CA" sz="1900" dirty="0"/>
+              <a:t>“name”: “Johanne </a:t>
+            </a:r>
+            <a:r>
+              <a:rPr lang="en-CA" sz="1900" dirty="0" err="1"/>
+              <a:t>Bordeleau</a:t>
+            </a:r>
+            <a:r>
+              <a:rPr lang="en-CA" sz="1900" dirty="0"/>
+              <a:t>, </a:t>
+            </a:r>
+            <a:r>
+              <a:rPr lang="en-CA" sz="1900" dirty="0" err="1"/>
+              <a:t>P.Eng</a:t>
+            </a:r>
+            <a:r>
+              <a:rPr lang="en-CA" sz="1900" dirty="0"/>
+              <a:t>.”,</a:t>
+            </a:r>
+          </a:p>
+          <a:p>
+            <a:pPr marL="0" indent="0">
+              <a:spcBef>
+                <a:spcPts val="300"/>
+              </a:spcBef>
+              <a:buNone/>
+            </a:pPr>
+            <a:r>
+              <a:rPr lang="en-CA" sz="1900" dirty="0">
+                <a:effectLst/>
+              </a:rPr>
+              <a:t>“role”: “software engineer having fun”,</a:t>
             </a:r>
             <a:br>
               <a:rPr lang="en-CA" sz="1900" dirty="0">
@@ -4097,81 +4164,7 @@
               <a:rPr lang="en-CA" sz="1900" dirty="0">
                 <a:effectLst/>
               </a:rPr>
-              <a:t>}</a:t>
-            </a:r>
-          </a:p>
-          <a:p>
-            <a:pPr marL="0" indent="0">
-              <a:spcBef>
-                <a:spcPts val="300"/>
-              </a:spcBef>
-              <a:buNone/>
-            </a:pPr>
-            <a:endParaRPr lang="en-US" sz="1900" dirty="0"/>
-          </a:p>
-          <a:p>
-            <a:pPr marL="0" indent="0">
-              <a:spcBef>
-                <a:spcPts val="300"/>
-              </a:spcBef>
-              <a:buNone/>
-            </a:pPr>
-            <a:endParaRPr lang="en-CA" sz="1900" dirty="0"/>
-          </a:p>
-          <a:p>
-            <a:pPr marL="0" indent="0">
-              <a:spcBef>
-                <a:spcPts val="300"/>
-              </a:spcBef>
-              <a:buNone/>
-            </a:pPr>
-            <a:r>
-              <a:rPr lang="en-CA" sz="1900" dirty="0">
-                <a:effectLst/>
-              </a:rPr>
-              <a:t>{ </a:t>
-            </a:r>
-          </a:p>
-          <a:p>
-            <a:pPr marL="0" indent="0">
-              <a:spcBef>
-                <a:spcPts val="300"/>
-              </a:spcBef>
-              <a:buNone/>
-            </a:pPr>
-            <a:r>
-              <a:rPr lang="en-CA" sz="1900" dirty="0"/>
-              <a:t>“name”: “Johanne </a:t>
-            </a:r>
-            <a:r>
-              <a:rPr lang="en-CA" sz="1900" dirty="0" err="1"/>
-              <a:t>Bordeleau</a:t>
-            </a:r>
-            <a:r>
-              <a:rPr lang="en-CA" sz="1900" dirty="0"/>
-              <a:t>, </a:t>
-            </a:r>
-            <a:r>
-              <a:rPr lang="en-CA" sz="1900" dirty="0" err="1"/>
-              <a:t>P.Eng</a:t>
-            </a:r>
-            <a:r>
-              <a:rPr lang="en-CA" sz="1900" dirty="0"/>
-              <a:t>.”,</a:t>
-            </a:r>
-          </a:p>
-          <a:p>
-            <a:pPr marL="0" indent="0">
-              <a:spcBef>
-                <a:spcPts val="300"/>
-              </a:spcBef>
-              <a:buNone/>
-            </a:pPr>
-            <a:r>
-              <a:rPr lang="en-CA" sz="1900" dirty="0">
-                <a:effectLst/>
-              </a:rPr>
-              <a:t>“role”: “software engineer having fun”,</a:t>
+              <a:t>“occupation" : “Senior Software Engineer,",</a:t>
             </a:r>
             <a:br>
               <a:rPr lang="en-CA" sz="1900" dirty="0">
@@ -4182,7 +4175,7 @@
               <a:rPr lang="en-CA" sz="1900" dirty="0">
                 <a:effectLst/>
               </a:rPr>
-              <a:t>“occupation" : “Senior Software Engineer,  Data Architect",</a:t>
+              <a:t>"email" : “johannebordeleau@bell.net",</a:t>
             </a:r>
             <a:br>
               <a:rPr lang="en-CA" sz="1900" dirty="0">
@@ -4193,7 +4186,7 @@
               <a:rPr lang="en-CA" sz="1900" dirty="0">
                 <a:effectLst/>
               </a:rPr>
-              <a:t>"company" : "IBM",</a:t>
+              <a:t>"mobile" : "(613) 791-6655"</a:t>
             </a:r>
             <a:br>
               <a:rPr lang="en-CA" sz="1900" dirty="0">
@@ -4204,7 +4197,56 @@
               <a:rPr lang="en-CA" sz="1900" dirty="0">
                 <a:effectLst/>
               </a:rPr>
-              <a:t>"email" : “johannebordeleau@bell.net",</a:t>
+              <a:t>}</a:t>
+            </a:r>
+          </a:p>
+          <a:p>
+            <a:pPr marL="0" indent="0">
+              <a:spcBef>
+                <a:spcPts val="300"/>
+              </a:spcBef>
+              <a:buNone/>
+            </a:pPr>
+            <a:endParaRPr lang="en-CA" sz="1900" dirty="0"/>
+          </a:p>
+          <a:p>
+            <a:pPr marL="0" indent="0">
+              <a:spcBef>
+                <a:spcPts val="300"/>
+              </a:spcBef>
+              <a:buNone/>
+            </a:pPr>
+            <a:r>
+              <a:rPr lang="en-CA" sz="1900" dirty="0">
+                <a:effectLst/>
+              </a:rPr>
+              <a:t>{ </a:t>
+            </a:r>
+          </a:p>
+          <a:p>
+            <a:pPr marL="0" indent="0">
+              <a:spcBef>
+                <a:spcPts val="300"/>
+              </a:spcBef>
+              <a:buNone/>
+            </a:pPr>
+            <a:r>
+              <a:rPr lang="en-CA" sz="1900" dirty="0"/>
+              <a:t>“name”: “Johnny Slater”,</a:t>
+            </a:r>
+          </a:p>
+          <a:p>
+            <a:pPr marL="0" indent="0">
+              <a:spcBef>
+                <a:spcPts val="300"/>
+              </a:spcBef>
+              <a:buNone/>
+            </a:pPr>
+            <a:r>
+              <a:rPr lang="en-CA" sz="1900" dirty="0">
+                <a:effectLst/>
+              </a:rPr>
+              <a:t>“role”: “SME day dreaming”,</a:t>
             </a:r>
             <a:br>
               <a:rPr lang="en-CA" sz="1900" dirty="0">
@@ -4215,77 +4257,6 @@
               <a:rPr lang="en-CA" sz="1900" dirty="0">
                 <a:effectLst/>
               </a:rPr>
-              <a:t>"mobile" : "(613) 791-6655"</a:t>
-            </a:r>
-            <a:br>
-              <a:rPr lang="en-CA" sz="1900" dirty="0">
-                <a:effectLst/>
-              </a:rPr>
-            </a:br>
-            <a:r>
-              <a:rPr lang="en-CA" sz="1900" dirty="0">
-                <a:effectLst/>
-              </a:rPr>
-              <a:t>}</a:t>
-            </a:r>
-          </a:p>
-          <a:p>
-            <a:pPr marL="0" indent="0">
-              <a:spcBef>
-                <a:spcPts val="300"/>
-              </a:spcBef>
-              <a:buNone/>
-            </a:pPr>
-            <a:endParaRPr lang="en-CA" sz="1900" dirty="0"/>
-          </a:p>
-          <a:p>
-            <a:pPr marL="0" indent="0">
-              <a:spcBef>
-                <a:spcPts val="300"/>
-              </a:spcBef>
-              <a:buNone/>
-            </a:pPr>
-            <a:r>
-              <a:rPr lang="en-CA" sz="1900" dirty="0">
-                <a:effectLst/>
-              </a:rPr>
-              <a:t>{ </a:t>
-            </a:r>
-          </a:p>
-          <a:p>
-            <a:pPr marL="0" indent="0">
-              <a:spcBef>
-                <a:spcPts val="300"/>
-              </a:spcBef>
-              <a:buNone/>
-            </a:pPr>
-            <a:r>
-              <a:rPr lang="en-CA" sz="1900" dirty="0"/>
-              <a:t>“name”: “Johnny Slater”,</a:t>
-            </a:r>
-          </a:p>
-          <a:p>
-            <a:pPr marL="0" indent="0">
-              <a:spcBef>
-                <a:spcPts val="300"/>
-              </a:spcBef>
-              <a:buNone/>
-            </a:pPr>
-            <a:r>
-              <a:rPr lang="en-CA" sz="1900" dirty="0">
-                <a:effectLst/>
-              </a:rPr>
-              <a:t>“role”: “SME day dreaming”,</a:t>
-            </a:r>
-            <a:br>
-              <a:rPr lang="en-CA" sz="1900" dirty="0">
-                <a:effectLst/>
-              </a:rPr>
-            </a:br>
-            <a:r>
-              <a:rPr lang="en-CA" sz="1900" dirty="0">
-                <a:effectLst/>
-              </a:rPr>
               <a:t>"title" : “</a:t>
             </a:r>
             <a:r>
@@ -4297,17 +4268,6 @@
                 <a:effectLst/>
               </a:rPr>
               <a:t>Architect",</a:t>
-            </a:r>
-            <a:br>
-              <a:rPr lang="en-CA" sz="1900" dirty="0">
-                <a:effectLst/>
-              </a:rPr>
-            </a:br>
-            <a:r>
-              <a:rPr lang="en-CA" sz="1900" dirty="0">
-                <a:effectLst/>
-              </a:rPr>
-              <a:t>"company" : “DND",</a:t>
             </a:r>
             <a:br>
               <a:rPr lang="en-CA" sz="1900" dirty="0">
@@ -4454,7 +4414,7 @@
         </p:blipFill>
         <p:spPr>
           <a:xfrm>
-            <a:off x="6156960" y="4953000"/>
+            <a:off x="4786343" y="4861560"/>
             <a:ext cx="1219200" cy="1219200"/>
           </a:xfrm>
           <a:prstGeom prst="rect">
@@ -4484,7 +4444,7 @@
         </p:blipFill>
         <p:spPr>
           <a:xfrm>
-            <a:off x="6060440" y="3124200"/>
+            <a:off x="4786343" y="2948940"/>
             <a:ext cx="1341120" cy="1341120"/>
           </a:xfrm>
           <a:prstGeom prst="rect">
@@ -4514,8 +4474,8 @@
         </p:blipFill>
         <p:spPr>
           <a:xfrm>
-            <a:off x="5638800" y="762000"/>
-            <a:ext cx="2209800" cy="2209800"/>
+            <a:off x="6923754" y="846435"/>
+            <a:ext cx="2102505" cy="2102505"/>
           </a:xfrm>
           <a:prstGeom prst="rect">
             <a:avLst/>
@@ -4609,7 +4569,7 @@
           <a:p>
             <a:r>
               <a:rPr lang="en-US" sz="2400" b="1" dirty="0"/>
-              <a:t>The Challenge</a:t>
+              <a:t>WARM Solution Overview</a:t>
             </a:r>
             <a:endParaRPr lang="en-CA" sz="2400" b="1" dirty="0"/>
           </a:p>
@@ -4672,79 +4632,34 @@
           </a:p>
         </p:txBody>
       </p:sp>
-      <p:sp>
-        <p:nvSpPr>
-          <p:cNvPr id="3" name="Rectangle 2"/>
-          <p:cNvSpPr/>
-          <p:nvPr/>
-        </p:nvSpPr>
-        <p:spPr>
-          <a:xfrm>
-            <a:off x="914400" y="990600"/>
-            <a:ext cx="6781800" cy="1754326"/>
-          </a:xfrm>
-          <a:prstGeom prst="rect">
-            <a:avLst/>
-          </a:prstGeom>
-        </p:spPr>
-        <p:txBody>
-          <a:bodyPr wrap="square">
-            <a:spAutoFit/>
-          </a:bodyPr>
-          <a:lstStyle/>
-          <a:p>
-            <a:r>
-              <a:rPr lang="en-CA" dirty="0"/>
-              <a:t>Your challenge is to develop interactive 3D tools that display trajectories, spacecraft, instrumentation, Earth coverage, and data visualizations! Research previous and ongoing Earth science missions and available data, and develop a tool that explains the mission or visualizes the data collected.  Design your tool to engage the general public, especially teachers and students!</a:t>
-            </a:r>
-          </a:p>
-        </p:txBody>
-      </p:sp>
       <p:pic>
         <p:nvPicPr>
-          <p:cNvPr id="1026" name="Picture 2" descr="Health Effects of Ionizing Radiation"/>
+          <p:cNvPr id="4" name="Picture 3"/>
           <p:cNvPicPr>
-            <a:picLocks noChangeAspect="1" noChangeArrowheads="1"/>
+            <a:picLocks noChangeAspect="1"/>
           </p:cNvPicPr>
           <p:nvPr/>
         </p:nvPicPr>
         <p:blipFill>
-          <a:blip r:embed="rId2">
-            <a:extLst>
-              <a:ext uri="{28A0092B-C50C-407E-A947-70E740481C1C}">
-                <a14:useLocalDpi xmlns:a14="http://schemas.microsoft.com/office/drawing/2010/main" val="0"/>
-              </a:ext>
-            </a:extLst>
-          </a:blip>
-          <a:srcRect/>
+          <a:blip r:embed="rId2"/>
           <a:stretch>
             <a:fillRect/>
           </a:stretch>
         </p:blipFill>
-        <p:spPr bwMode="auto">
-          <a:xfrm>
-            <a:off x="2971800" y="3454904"/>
-            <a:ext cx="4286250" cy="2314575"/>
+        <p:spPr>
+          <a:xfrm>
+            <a:off x="302099" y="1341383"/>
+            <a:ext cx="8539801" cy="4175234"/>
           </a:xfrm>
           <a:prstGeom prst="rect">
             <a:avLst/>
           </a:prstGeom>
-          <a:noFill/>
-          <a:extLst>
-            <a:ext uri="{909E8E84-426E-40DD-AFC4-6F175D3DCCD1}">
-              <a14:hiddenFill xmlns:a14="http://schemas.microsoft.com/office/drawing/2010/main">
-                <a:solidFill>
-                  <a:srgbClr val="FFFFFF"/>
-                </a:solidFill>
-              </a14:hiddenFill>
-            </a:ext>
-          </a:extLst>
         </p:spPr>
       </p:pic>
     </p:spTree>
     <p:extLst>
       <p:ext uri="{BB962C8B-B14F-4D97-AF65-F5344CB8AC3E}">
-        <p14:creationId xmlns:p14="http://schemas.microsoft.com/office/powerpoint/2010/main" val="1892699513"/>
+        <p14:creationId xmlns:p14="http://schemas.microsoft.com/office/powerpoint/2010/main" val="2268580251"/>
       </p:ext>
     </p:extLst>
   </p:cSld>
@@ -4798,7 +4713,7 @@
           <a:p>
             <a:r>
               <a:rPr lang="en-US" sz="2400" b="1" dirty="0"/>
-              <a:t>The Opportunity</a:t>
+              <a:t>WARM Mock-Up</a:t>
             </a:r>
             <a:endParaRPr lang="en-CA" sz="2400" b="1" dirty="0"/>
           </a:p>
@@ -4861,10 +4776,34 @@
           </a:p>
         </p:txBody>
       </p:sp>
+      <p:pic>
+        <p:nvPicPr>
+          <p:cNvPr id="5" name="Picture 4"/>
+          <p:cNvPicPr>
+            <a:picLocks noChangeAspect="1"/>
+          </p:cNvPicPr>
+          <p:nvPr/>
+        </p:nvPicPr>
+        <p:blipFill>
+          <a:blip r:embed="rId2"/>
+          <a:stretch>
+            <a:fillRect/>
+          </a:stretch>
+        </p:blipFill>
+        <p:spPr>
+          <a:xfrm>
+            <a:off x="289199" y="591900"/>
+            <a:ext cx="8565601" cy="5674200"/>
+          </a:xfrm>
+          <a:prstGeom prst="rect">
+            <a:avLst/>
+          </a:prstGeom>
+        </p:spPr>
+      </p:pic>
     </p:spTree>
     <p:extLst>
       <p:ext uri="{BB962C8B-B14F-4D97-AF65-F5344CB8AC3E}">
-        <p14:creationId xmlns:p14="http://schemas.microsoft.com/office/powerpoint/2010/main" val="1784346232"/>
+        <p14:creationId xmlns:p14="http://schemas.microsoft.com/office/powerpoint/2010/main" val="3695575715"/>
       </p:ext>
     </p:extLst>
   </p:cSld>
@@ -4918,7 +4857,7 @@
           <a:p>
             <a:r>
               <a:rPr lang="en-US" sz="2400" b="1" dirty="0"/>
-              <a:t>The Solution Overview</a:t>
+              <a:t>WARM System Context</a:t>
             </a:r>
             <a:endParaRPr lang="en-CA" sz="2400" b="1" dirty="0"/>
           </a:p>
@@ -4981,87 +4920,10 @@
           </a:p>
         </p:txBody>
       </p:sp>
-      <p:sp>
-        <p:nvSpPr>
-          <p:cNvPr id="3" name="TextBox 2"/>
-          <p:cNvSpPr txBox="1"/>
-          <p:nvPr/>
-        </p:nvSpPr>
-        <p:spPr>
-          <a:xfrm>
-            <a:off x="762000" y="990600"/>
-            <a:ext cx="6629400" cy="2585323"/>
-          </a:xfrm>
-          <a:prstGeom prst="rect">
-            <a:avLst/>
-          </a:prstGeom>
-          <a:noFill/>
-        </p:spPr>
-        <p:txBody>
-          <a:bodyPr wrap="square" rtlCol="0">
-            <a:spAutoFit/>
-          </a:bodyPr>
-          <a:lstStyle/>
-          <a:p>
-            <a:r>
-              <a:rPr lang="en-US" dirty="0"/>
-              <a:t>Used technologies:</a:t>
-            </a:r>
-          </a:p>
-          <a:p>
-            <a:endParaRPr lang="en-US" dirty="0"/>
-          </a:p>
-          <a:p>
-            <a:r>
-              <a:rPr lang="en-US" dirty="0"/>
-              <a:t>JSON</a:t>
-            </a:r>
-          </a:p>
-          <a:p>
-            <a:r>
-              <a:rPr lang="en-US"/>
-              <a:t>HTTP / REST</a:t>
-            </a:r>
-            <a:endParaRPr lang="en-US" dirty="0"/>
-          </a:p>
-          <a:p>
-            <a:r>
-              <a:rPr lang="en-US" dirty="0"/>
-              <a:t>Node.js</a:t>
-            </a:r>
-          </a:p>
-          <a:p>
-            <a:r>
-              <a:rPr lang="en-US" dirty="0"/>
-              <a:t>3D </a:t>
-            </a:r>
-            <a:r>
-              <a:rPr lang="en-US" dirty="0" err="1"/>
-              <a:t>WebGL</a:t>
-            </a:r>
-            <a:endParaRPr lang="en-US" dirty="0"/>
-          </a:p>
-          <a:p>
-            <a:r>
-              <a:rPr lang="en-US" dirty="0"/>
-              <a:t>OAUTH (?)</a:t>
-            </a:r>
-          </a:p>
-          <a:p>
-            <a:r>
-              <a:rPr lang="en-US" dirty="0"/>
-              <a:t>JavaScript / Java</a:t>
-            </a:r>
-          </a:p>
-          <a:p>
-            <a:endParaRPr lang="en-CA" dirty="0"/>
-          </a:p>
-        </p:txBody>
-      </p:sp>
     </p:spTree>
     <p:extLst>
       <p:ext uri="{BB962C8B-B14F-4D97-AF65-F5344CB8AC3E}">
-        <p14:creationId xmlns:p14="http://schemas.microsoft.com/office/powerpoint/2010/main" val="2268580251"/>
+        <p14:creationId xmlns:p14="http://schemas.microsoft.com/office/powerpoint/2010/main" val="2892020498"/>
       </p:ext>
     </p:extLst>
   </p:cSld>
@@ -5115,7 +4977,7 @@
           <a:p>
             <a:r>
               <a:rPr lang="en-US" sz="2400" b="1" dirty="0"/>
-              <a:t>System Context</a:t>
+              <a:t>Component Architecture</a:t>
             </a:r>
             <a:endParaRPr lang="en-CA" sz="2400" b="1" dirty="0"/>
           </a:p>
@@ -5181,7 +5043,7 @@
     </p:spTree>
     <p:extLst>
       <p:ext uri="{BB962C8B-B14F-4D97-AF65-F5344CB8AC3E}">
-        <p14:creationId xmlns:p14="http://schemas.microsoft.com/office/powerpoint/2010/main" val="2892020498"/>
+        <p14:creationId xmlns:p14="http://schemas.microsoft.com/office/powerpoint/2010/main" val="2519252995"/>
       </p:ext>
     </p:extLst>
   </p:cSld>
@@ -5192,126 +5054,6 @@
 </file>
 
 <file path=ppt/slides/slide7.xml><?xml version="1.0" encoding="utf-8"?>
-<p:sld xmlns:a="http://schemas.openxmlformats.org/drawingml/2006/main" xmlns:r="http://schemas.openxmlformats.org/officeDocument/2006/relationships" xmlns:p="http://schemas.openxmlformats.org/presentationml/2006/main">
-  <p:cSld>
-    <p:spTree>
-      <p:nvGrpSpPr>
-        <p:cNvPr id="1" name=""/>
-        <p:cNvGrpSpPr/>
-        <p:nvPr/>
-      </p:nvGrpSpPr>
-      <p:grpSpPr>
-        <a:xfrm>
-          <a:off x="0" y="0"/>
-          <a:ext cx="0" cy="0"/>
-          <a:chOff x="0" y="0"/>
-          <a:chExt cx="0" cy="0"/>
-        </a:xfrm>
-      </p:grpSpPr>
-      <p:sp>
-        <p:nvSpPr>
-          <p:cNvPr id="2" name="Title 1"/>
-          <p:cNvSpPr>
-            <a:spLocks noGrp="1"/>
-          </p:cNvSpPr>
-          <p:nvPr>
-            <p:ph type="title"/>
-          </p:nvPr>
-        </p:nvSpPr>
-        <p:spPr>
-          <a:xfrm>
-            <a:off x="0" y="0"/>
-            <a:ext cx="9144000" cy="457200"/>
-          </a:xfrm>
-          <a:solidFill>
-            <a:schemeClr val="accent1"/>
-          </a:solidFill>
-        </p:spPr>
-        <p:txBody>
-          <a:bodyPr>
-            <a:normAutofit/>
-          </a:bodyPr>
-          <a:lstStyle/>
-          <a:p>
-            <a:r>
-              <a:rPr lang="en-US" sz="2400" b="1" dirty="0"/>
-              <a:t>Component Architecture</a:t>
-            </a:r>
-            <a:endParaRPr lang="en-CA" sz="2400" b="1" dirty="0"/>
-          </a:p>
-        </p:txBody>
-      </p:sp>
-      <p:cxnSp>
-        <p:nvCxnSpPr>
-          <p:cNvPr id="13" name="Straight Connector 12"/>
-          <p:cNvCxnSpPr/>
-          <p:nvPr/>
-        </p:nvCxnSpPr>
-        <p:spPr>
-          <a:xfrm>
-            <a:off x="381000" y="6553200"/>
-            <a:ext cx="8305800" cy="0"/>
-          </a:xfrm>
-          <a:prstGeom prst="line">
-            <a:avLst/>
-          </a:prstGeom>
-        </p:spPr>
-        <p:style>
-          <a:lnRef idx="1">
-            <a:schemeClr val="accent1"/>
-          </a:lnRef>
-          <a:fillRef idx="0">
-            <a:schemeClr val="accent1"/>
-          </a:fillRef>
-          <a:effectRef idx="0">
-            <a:schemeClr val="accent1"/>
-          </a:effectRef>
-          <a:fontRef idx="minor">
-            <a:schemeClr val="tx1"/>
-          </a:fontRef>
-        </p:style>
-      </p:cxnSp>
-      <p:sp>
-        <p:nvSpPr>
-          <p:cNvPr id="14" name="Date Placeholder 13"/>
-          <p:cNvSpPr>
-            <a:spLocks noGrp="1"/>
-          </p:cNvSpPr>
-          <p:nvPr>
-            <p:ph type="dt" sz="half" idx="10"/>
-          </p:nvPr>
-        </p:nvSpPr>
-        <p:spPr>
-          <a:xfrm>
-            <a:off x="381000" y="6553200"/>
-            <a:ext cx="2133600" cy="274320"/>
-          </a:xfrm>
-        </p:spPr>
-        <p:txBody>
-          <a:bodyPr/>
-          <a:lstStyle/>
-          <a:p>
-            <a:r>
-              <a:rPr lang="en-CA" dirty="0"/>
-              <a:t>2017-04-27</a:t>
-            </a:r>
-          </a:p>
-        </p:txBody>
-      </p:sp>
-    </p:spTree>
-    <p:extLst>
-      <p:ext uri="{BB962C8B-B14F-4D97-AF65-F5344CB8AC3E}">
-        <p14:creationId xmlns:p14="http://schemas.microsoft.com/office/powerpoint/2010/main" val="2519252995"/>
-      </p:ext>
-    </p:extLst>
-  </p:cSld>
-  <p:clrMapOvr>
-    <a:masterClrMapping/>
-  </p:clrMapOvr>
-</p:sld>
-</file>
-
-<file path=ppt/slides/slide8.xml><?xml version="1.0" encoding="utf-8"?>
 <p:sld xmlns:a="http://schemas.openxmlformats.org/drawingml/2006/main" xmlns:r="http://schemas.openxmlformats.org/officeDocument/2006/relationships" xmlns:p="http://schemas.openxmlformats.org/presentationml/2006/main">
   <p:cSld>
     <p:spTree>

</xml_diff>